<commit_message>
Added more PPT layouts.
</commit_message>
<xml_diff>
--- a/data/templates/template-dark.pptx
+++ b/data/templates/template-dark.pptx
@@ -133,7 +133,7 @@
             <a:spLocks noGrp="1"/>
           </p:cNvSpPr>
           <p:nvPr>
-            <p:ph type="ctrTitle"/>
+            <p:ph type="ctrTitle" hasCustomPrompt="1"/>
           </p:nvPr>
         </p:nvSpPr>
         <p:spPr>
@@ -167,7 +167,10 @@
             </a:lvl1pPr>
           </a:lstStyle>
           <a:p>
-            <a:endParaRPr lang="en-US" dirty="0"/>
+            <a:r>
+              <a:rPr lang="en-US" dirty="0"/>
+              <a:t>10x5</a:t>
+            </a:r>
           </a:p>
         </p:txBody>
       </p:sp>
@@ -178,7 +181,7 @@
             <a:spLocks noGrp="1"/>
           </p:cNvSpPr>
           <p:nvPr>
-            <p:ph type="subTitle" idx="1"/>
+            <p:ph type="subTitle" idx="1" hasCustomPrompt="1"/>
           </p:nvPr>
         </p:nvSpPr>
         <p:spPr>
@@ -192,9 +195,22 @@
             <a:normAutofit/>
           </a:bodyPr>
           <a:lstStyle>
-            <a:lvl1pPr marL="0" indent="0" algn="l">
-              <a:buNone/>
-              <a:defRPr sz="6000" b="0" cap="all" baseline="0">
+            <a:lvl1pPr marL="0" marR="0" indent="0" algn="l" defTabSz="914400" rtl="0" eaLnBrk="1" fontAlgn="auto" latinLnBrk="0" hangingPunct="1">
+              <a:lnSpc>
+                <a:spcPct val="90000"/>
+              </a:lnSpc>
+              <a:spcBef>
+                <a:spcPts val="1000"/>
+              </a:spcBef>
+              <a:spcAft>
+                <a:spcPts val="0"/>
+              </a:spcAft>
+              <a:buClrTx/>
+              <a:buSzTx/>
+              <a:buFont typeface="Arial" panose="020B0604020202020204" pitchFamily="34" charset="0"/>
+              <a:buNone/>
+              <a:tabLst/>
+              <a:defRPr sz="6600" b="0" cap="all" baseline="0">
                 <a:solidFill>
                   <a:srgbClr val="FFFFCC"/>
                 </a:solidFill>
@@ -242,6 +258,13 @@
               <a:defRPr sz="1200"/>
             </a:lvl9pPr>
           </a:lstStyle>
+          <a:p>
+            <a:r>
+              <a:rPr lang="zh-TW" altLang="en-US" dirty="0"/>
+              <a:t>主主主主主主主主主主主主主主主主主主主主主主主主主主主主主主主主主主主主主主主主主主主主主主主主主主</a:t>
+            </a:r>
+            <a:endParaRPr lang="en-US" dirty="0"/>
+          </a:p>
           <a:p>
             <a:endParaRPr lang="en-US" dirty="0"/>
           </a:p>
@@ -315,7 +338,7 @@
             <a:spLocks noGrp="1"/>
           </p:cNvSpPr>
           <p:nvPr>
-            <p:ph type="ctrTitle"/>
+            <p:ph type="ctrTitle" hasCustomPrompt="1"/>
           </p:nvPr>
         </p:nvSpPr>
         <p:spPr>
@@ -349,7 +372,10 @@
             </a:lvl1pPr>
           </a:lstStyle>
           <a:p>
-            <a:endParaRPr lang="en-US" dirty="0"/>
+            <a:r>
+              <a:rPr lang="en-US" dirty="0"/>
+              <a:t>12x6</a:t>
+            </a:r>
           </a:p>
         </p:txBody>
       </p:sp>
@@ -360,7 +386,7 @@
             <a:spLocks noGrp="1"/>
           </p:cNvSpPr>
           <p:nvPr>
-            <p:ph type="subTitle" idx="1"/>
+            <p:ph type="subTitle" idx="1" hasCustomPrompt="1"/>
           </p:nvPr>
         </p:nvSpPr>
         <p:spPr>
@@ -376,7 +402,7 @@
           <a:lstStyle>
             <a:lvl1pPr marL="0" indent="0" algn="l">
               <a:buNone/>
-              <a:defRPr sz="4800" b="0" cap="all" baseline="0">
+              <a:defRPr sz="5200" b="0" cap="all" baseline="0">
                 <a:solidFill>
                   <a:srgbClr val="FFFFCC"/>
                 </a:solidFill>
@@ -424,6 +450,48 @@
               <a:defRPr sz="1200"/>
             </a:lvl9pPr>
           </a:lstStyle>
+          <a:p>
+            <a:r>
+              <a:rPr lang="zh-TW" altLang="en-US" dirty="0"/>
+              <a:t>主主主主主主主主主主主主</a:t>
+            </a:r>
+            <a:endParaRPr lang="en-US" dirty="0"/>
+          </a:p>
+          <a:p>
+            <a:r>
+              <a:rPr lang="zh-TW" altLang="en-US" dirty="0"/>
+              <a:t>主主主主主主主主主主主主</a:t>
+            </a:r>
+            <a:endParaRPr lang="en-US" dirty="0"/>
+          </a:p>
+          <a:p>
+            <a:r>
+              <a:rPr lang="zh-TW" altLang="en-US" dirty="0"/>
+              <a:t>主主主主主主主主主主主主</a:t>
+            </a:r>
+            <a:endParaRPr lang="en-US" dirty="0"/>
+          </a:p>
+          <a:p>
+            <a:r>
+              <a:rPr lang="zh-TW" altLang="en-US" dirty="0"/>
+              <a:t>主主主主主主主主主主主主</a:t>
+            </a:r>
+            <a:endParaRPr lang="en-US" dirty="0"/>
+          </a:p>
+          <a:p>
+            <a:r>
+              <a:rPr lang="zh-TW" altLang="en-US" dirty="0"/>
+              <a:t>主主主主主主主主主主主主</a:t>
+            </a:r>
+            <a:endParaRPr lang="en-US" dirty="0"/>
+          </a:p>
+          <a:p>
+            <a:r>
+              <a:rPr lang="zh-TW" altLang="en-US" dirty="0"/>
+              <a:t>主主主主主主主主主主主主</a:t>
+            </a:r>
+            <a:endParaRPr lang="en-US" dirty="0"/>
+          </a:p>
           <a:p>
             <a:endParaRPr lang="en-US" dirty="0"/>
           </a:p>
@@ -475,7 +543,7 @@
 
 <file path=ppt/slideLayouts/slideLayout3.xml><?xml version="1.0" encoding="utf-8"?>
 <p:sldLayout xmlns:a="http://schemas.openxmlformats.org/drawingml/2006/main" xmlns:r="http://schemas.openxmlformats.org/officeDocument/2006/relationships" xmlns:p="http://schemas.openxmlformats.org/presentationml/2006/main" type="title" preserve="1">
-  <p:cSld name="Title Slide">
+  <p:cSld name="3_Title Slide">
     <p:spTree>
       <p:nvGrpSpPr>
         <p:cNvPr id="1" name=""/>
@@ -497,28 +565,44 @@
             <a:spLocks noGrp="1"/>
           </p:cNvSpPr>
           <p:nvPr>
-            <p:ph type="ctrTitle"/>
+            <p:ph type="ctrTitle" hasCustomPrompt="1"/>
           </p:nvPr>
         </p:nvSpPr>
         <p:spPr>
           <a:xfrm>
-            <a:off x="685800" y="1122363"/>
-            <a:ext cx="7772400" cy="2387600"/>
+            <a:off x="303255" y="263768"/>
+            <a:ext cx="8691276" cy="1104695"/>
           </a:xfrm>
         </p:spPr>
         <p:txBody>
-          <a:bodyPr anchor="b"/>
+          <a:bodyPr bIns="0" anchor="b">
+            <a:normAutofit/>
+          </a:bodyPr>
           <a:lstStyle>
-            <a:lvl1pPr algn="ctr">
-              <a:defRPr sz="6000"/>
+            <a:lvl1pPr algn="l">
+              <a:defRPr sz="2400">
+                <a:solidFill>
+                  <a:schemeClr val="accent4">
+                    <a:lumMod val="20000"/>
+                    <a:lumOff val="80000"/>
+                  </a:schemeClr>
+                </a:solidFill>
+                <a:effectLst>
+                  <a:outerShdw blurRad="38100" dist="38100" dir="2700000" algn="tl">
+                    <a:srgbClr val="000000">
+                      <a:alpha val="43137"/>
+                    </a:srgbClr>
+                  </a:outerShdw>
+                </a:effectLst>
+                <a:latin typeface="+mn-lt"/>
+              </a:defRPr>
             </a:lvl1pPr>
           </a:lstStyle>
           <a:p>
             <a:r>
-              <a:rPr lang="en-US"/>
-              <a:t>Click to edit Master title style</a:t>
-            </a:r>
-            <a:endParaRPr lang="en-US" dirty="0"/>
+              <a:rPr lang="en-US" dirty="0"/>
+              <a:t>15x8</a:t>
+            </a:r>
           </a:p>
         </p:txBody>
       </p:sp>
@@ -529,133 +613,309 @@
             <a:spLocks noGrp="1"/>
           </p:cNvSpPr>
           <p:nvPr>
-            <p:ph type="subTitle" idx="1"/>
+            <p:ph type="subTitle" idx="1" hasCustomPrompt="1"/>
           </p:nvPr>
         </p:nvSpPr>
         <p:spPr>
           <a:xfrm>
-            <a:off x="1143000" y="3602038"/>
-            <a:ext cx="6858000" cy="1655762"/>
+            <a:off x="303255" y="1608991"/>
+            <a:ext cx="8691276" cy="4985239"/>
           </a:xfrm>
         </p:spPr>
         <p:txBody>
-          <a:bodyPr/>
+          <a:bodyPr tIns="91440" bIns="91440">
+            <a:noAutofit/>
+          </a:bodyPr>
           <a:lstStyle>
-            <a:lvl1pPr marL="0" indent="0" algn="ctr">
-              <a:buNone/>
-              <a:defRPr sz="2400"/>
+            <a:lvl1pPr marL="0" indent="0" algn="l">
+              <a:buNone/>
+              <a:defRPr sz="4200" b="0" cap="all" baseline="0">
+                <a:solidFill>
+                  <a:srgbClr val="FFFFCC"/>
+                </a:solidFill>
+                <a:effectLst>
+                  <a:outerShdw blurRad="38100" dist="38100" dir="2700000" algn="tl">
+                    <a:srgbClr val="000000">
+                      <a:alpha val="43137"/>
+                    </a:srgbClr>
+                  </a:outerShdw>
+                </a:effectLst>
+                <a:latin typeface="5L2F-LISHU" panose="020B0609010101010101" pitchFamily="49" charset="-120"/>
+                <a:ea typeface="5L2F-LISHU" panose="020B0609010101010101" pitchFamily="49" charset="-120"/>
+              </a:defRPr>
             </a:lvl1pPr>
-            <a:lvl2pPr marL="457200" indent="0" algn="ctr">
-              <a:buNone/>
-              <a:defRPr sz="2000"/>
+            <a:lvl2pPr marL="342900" indent="0" algn="ctr">
+              <a:buNone/>
+              <a:defRPr sz="1350"/>
             </a:lvl2pPr>
-            <a:lvl3pPr marL="914400" indent="0" algn="ctr">
-              <a:buNone/>
-              <a:defRPr sz="1800"/>
+            <a:lvl3pPr marL="685800" indent="0" algn="ctr">
+              <a:buNone/>
+              <a:defRPr sz="1350"/>
             </a:lvl3pPr>
-            <a:lvl4pPr marL="1371600" indent="0" algn="ctr">
-              <a:buNone/>
-              <a:defRPr sz="1600"/>
+            <a:lvl4pPr marL="1028700" indent="0" algn="ctr">
+              <a:buNone/>
+              <a:defRPr sz="1200"/>
             </a:lvl4pPr>
-            <a:lvl5pPr marL="1828800" indent="0" algn="ctr">
-              <a:buNone/>
-              <a:defRPr sz="1600"/>
+            <a:lvl5pPr marL="1371600" indent="0" algn="ctr">
+              <a:buNone/>
+              <a:defRPr sz="1200"/>
             </a:lvl5pPr>
-            <a:lvl6pPr marL="2286000" indent="0" algn="ctr">
-              <a:buNone/>
-              <a:defRPr sz="1600"/>
+            <a:lvl6pPr marL="1714500" indent="0" algn="ctr">
+              <a:buNone/>
+              <a:defRPr sz="1200"/>
             </a:lvl6pPr>
-            <a:lvl7pPr marL="2743200" indent="0" algn="ctr">
-              <a:buNone/>
-              <a:defRPr sz="1600"/>
+            <a:lvl7pPr marL="2057400" indent="0" algn="ctr">
+              <a:buNone/>
+              <a:defRPr sz="1200"/>
             </a:lvl7pPr>
-            <a:lvl8pPr marL="3200400" indent="0" algn="ctr">
-              <a:buNone/>
-              <a:defRPr sz="1600"/>
+            <a:lvl8pPr marL="2400300" indent="0" algn="ctr">
+              <a:buNone/>
+              <a:defRPr sz="1200"/>
             </a:lvl8pPr>
-            <a:lvl9pPr marL="3657600" indent="0" algn="ctr">
-              <a:buNone/>
-              <a:defRPr sz="1600"/>
+            <a:lvl9pPr marL="2743200" indent="0" algn="ctr">
+              <a:buNone/>
+              <a:defRPr sz="1200"/>
             </a:lvl9pPr>
           </a:lstStyle>
           <a:p>
             <a:r>
-              <a:rPr lang="en-US"/>
-              <a:t>Click to edit Master subtitle style</a:t>
+              <a:rPr lang="zh-TW" altLang="en-US" dirty="0"/>
+              <a:t>主主主主主主主主主主主主主主主主主主主主主主主主主主主主主主主主主主主主主主主主主主主主主主主主主主主主主主主主主主主主主主主主主主主主主主主主主主主主主主主主主主主主主主主主主主主主主主主主主主主主主主主主主主主主主主主主主主主主主主主主</a:t>
             </a:r>
             <a:endParaRPr lang="en-US" dirty="0"/>
+          </a:p>
+          <a:p>
+            <a:endParaRPr lang="en-US" dirty="0"/>
+          </a:p>
+        </p:txBody>
+      </p:sp>
+      <p:cxnSp>
+        <p:nvCxnSpPr>
+          <p:cNvPr id="15" name="Straight Connector 14"/>
+          <p:cNvCxnSpPr/>
+          <p:nvPr/>
+        </p:nvCxnSpPr>
+        <p:spPr>
+          <a:xfrm>
+            <a:off x="303255" y="1488727"/>
+            <a:ext cx="5561213" cy="0"/>
+          </a:xfrm>
+          <a:prstGeom prst="line">
+            <a:avLst/>
+          </a:prstGeom>
+          <a:ln w="31750"/>
+        </p:spPr>
+        <p:style>
+          <a:lnRef idx="3">
+            <a:schemeClr val="accent1"/>
+          </a:lnRef>
+          <a:fillRef idx="0">
+            <a:schemeClr val="accent1"/>
+          </a:fillRef>
+          <a:effectRef idx="2">
+            <a:schemeClr val="accent1"/>
+          </a:effectRef>
+          <a:fontRef idx="minor">
+            <a:schemeClr val="tx1"/>
+          </a:fontRef>
+        </p:style>
+      </p:cxnSp>
+    </p:spTree>
+    <p:extLst>
+      <p:ext uri="{BB962C8B-B14F-4D97-AF65-F5344CB8AC3E}">
+        <p14:creationId xmlns:p14="http://schemas.microsoft.com/office/powerpoint/2010/main" val="1370709812"/>
+      </p:ext>
+    </p:extLst>
+  </p:cSld>
+  <p:clrMapOvr>
+    <a:masterClrMapping/>
+  </p:clrMapOvr>
+</p:sldLayout>
+</file>
+
+<file path=ppt/slideLayouts/slideLayout4.xml><?xml version="1.0" encoding="utf-8"?>
+<p:sldLayout xmlns:a="http://schemas.openxmlformats.org/drawingml/2006/main" xmlns:r="http://schemas.openxmlformats.org/officeDocument/2006/relationships" xmlns:p="http://schemas.openxmlformats.org/presentationml/2006/main" type="title" preserve="1">
+  <p:cSld name="4_Title Slide">
+    <p:spTree>
+      <p:nvGrpSpPr>
+        <p:cNvPr id="1" name=""/>
+        <p:cNvGrpSpPr/>
+        <p:nvPr/>
+      </p:nvGrpSpPr>
+      <p:grpSpPr>
+        <a:xfrm>
+          <a:off x="0" y="0"/>
+          <a:ext cx="0" cy="0"/>
+          <a:chOff x="0" y="0"/>
+          <a:chExt cx="0" cy="0"/>
+        </a:xfrm>
+      </p:grpSpPr>
+      <p:sp>
+        <p:nvSpPr>
+          <p:cNvPr id="2" name="Title 1"/>
+          <p:cNvSpPr>
+            <a:spLocks noGrp="1"/>
+          </p:cNvSpPr>
+          <p:nvPr>
+            <p:ph type="ctrTitle" hasCustomPrompt="1"/>
+          </p:nvPr>
+        </p:nvSpPr>
+        <p:spPr>
+          <a:xfrm>
+            <a:off x="303255" y="263768"/>
+            <a:ext cx="8691276" cy="1104695"/>
+          </a:xfrm>
+        </p:spPr>
+        <p:txBody>
+          <a:bodyPr bIns="0" anchor="b">
+            <a:normAutofit/>
+          </a:bodyPr>
+          <a:lstStyle>
+            <a:lvl1pPr algn="l">
+              <a:defRPr sz="2400">
+                <a:solidFill>
+                  <a:schemeClr val="accent4">
+                    <a:lumMod val="20000"/>
+                    <a:lumOff val="80000"/>
+                  </a:schemeClr>
+                </a:solidFill>
+                <a:effectLst>
+                  <a:outerShdw blurRad="38100" dist="38100" dir="2700000" algn="tl">
+                    <a:srgbClr val="000000">
+                      <a:alpha val="43137"/>
+                    </a:srgbClr>
+                  </a:outerShdw>
+                </a:effectLst>
+                <a:latin typeface="+mn-lt"/>
+              </a:defRPr>
+            </a:lvl1pPr>
+          </a:lstStyle>
+          <a:p>
+            <a:r>
+              <a:rPr lang="en-US" dirty="0"/>
+              <a:t>18x10</a:t>
+            </a:r>
           </a:p>
         </p:txBody>
       </p:sp>
       <p:sp>
         <p:nvSpPr>
-          <p:cNvPr id="4" name="Date Placeholder 3"/>
+          <p:cNvPr id="3" name="Subtitle 2"/>
           <p:cNvSpPr>
             <a:spLocks noGrp="1"/>
           </p:cNvSpPr>
           <p:nvPr>
-            <p:ph type="dt" sz="half" idx="10"/>
+            <p:ph type="subTitle" idx="1" hasCustomPrompt="1"/>
           </p:nvPr>
         </p:nvSpPr>
-        <p:spPr/>
+        <p:spPr>
+          <a:xfrm>
+            <a:off x="303255" y="1608991"/>
+            <a:ext cx="8691276" cy="4985239"/>
+          </a:xfrm>
+        </p:spPr>
         <p:txBody>
-          <a:bodyPr/>
-          <a:lstStyle/>
-          <a:p>
-            <a:fld id="{1DD3C610-0DB2-47DC-8EBA-6CA1535FDECD}" type="datetimeFigureOut">
-              <a:rPr lang="en-US" smtClean="0"/>
-              <a:t>5/13/2016</a:t>
-            </a:fld>
-            <a:endParaRPr lang="en-US"/>
+          <a:bodyPr tIns="91440" bIns="91440">
+            <a:noAutofit/>
+          </a:bodyPr>
+          <a:lstStyle>
+            <a:lvl1pPr marL="0" indent="0" algn="l">
+              <a:buNone/>
+              <a:defRPr sz="3600" b="0" cap="all" baseline="0">
+                <a:solidFill>
+                  <a:srgbClr val="FFFFCC"/>
+                </a:solidFill>
+                <a:effectLst>
+                  <a:outerShdw blurRad="38100" dist="38100" dir="2700000" algn="tl">
+                    <a:srgbClr val="000000">
+                      <a:alpha val="43137"/>
+                    </a:srgbClr>
+                  </a:outerShdw>
+                </a:effectLst>
+                <a:latin typeface="5L2F-LISHU" panose="020B0609010101010101" pitchFamily="49" charset="-120"/>
+                <a:ea typeface="5L2F-LISHU" panose="020B0609010101010101" pitchFamily="49" charset="-120"/>
+              </a:defRPr>
+            </a:lvl1pPr>
+            <a:lvl2pPr marL="342900" indent="0" algn="ctr">
+              <a:buNone/>
+              <a:defRPr sz="1350"/>
+            </a:lvl2pPr>
+            <a:lvl3pPr marL="685800" indent="0" algn="ctr">
+              <a:buNone/>
+              <a:defRPr sz="1350"/>
+            </a:lvl3pPr>
+            <a:lvl4pPr marL="1028700" indent="0" algn="ctr">
+              <a:buNone/>
+              <a:defRPr sz="1200"/>
+            </a:lvl4pPr>
+            <a:lvl5pPr marL="1371600" indent="0" algn="ctr">
+              <a:buNone/>
+              <a:defRPr sz="1200"/>
+            </a:lvl5pPr>
+            <a:lvl6pPr marL="1714500" indent="0" algn="ctr">
+              <a:buNone/>
+              <a:defRPr sz="1200"/>
+            </a:lvl6pPr>
+            <a:lvl7pPr marL="2057400" indent="0" algn="ctr">
+              <a:buNone/>
+              <a:defRPr sz="1200"/>
+            </a:lvl7pPr>
+            <a:lvl8pPr marL="2400300" indent="0" algn="ctr">
+              <a:buNone/>
+              <a:defRPr sz="1200"/>
+            </a:lvl8pPr>
+            <a:lvl9pPr marL="2743200" indent="0" algn="ctr">
+              <a:buNone/>
+              <a:defRPr sz="1200"/>
+            </a:lvl9pPr>
+          </a:lstStyle>
+          <a:p>
+            <a:r>
+              <a:rPr lang="zh-TW" altLang="en-US" dirty="0"/>
+              <a:t>主主主主主主主主主主主主主主主主主主主主主主主主主主主主主主主主主主主主主主主主主主主主主主主主主主主主主主主主主主主主主主主主主主主主主主主主主主主主主主主主主主主主主主主主主主主主主主主主主主主主主主主主主主主主主主主主主主主主主主主主主主主主主主主主主主主主主主主主主主主主主主主主主主主主主主主主主主主主主主主主主主主主主主主主主主主主主主主主主主主主</a:t>
+            </a:r>
+            <a:endParaRPr lang="en-US" dirty="0"/>
+          </a:p>
+          <a:p>
+            <a:endParaRPr lang="en-US" dirty="0"/>
           </a:p>
         </p:txBody>
       </p:sp>
-      <p:sp>
-        <p:nvSpPr>
-          <p:cNvPr id="5" name="Footer Placeholder 4"/>
-          <p:cNvSpPr>
-            <a:spLocks noGrp="1"/>
-          </p:cNvSpPr>
-          <p:nvPr>
-            <p:ph type="ftr" sz="quarter" idx="11"/>
-          </p:nvPr>
-        </p:nvSpPr>
-        <p:spPr/>
-        <p:txBody>
-          <a:bodyPr/>
-          <a:lstStyle/>
-          <a:p>
-            <a:endParaRPr lang="en-US"/>
-          </a:p>
-        </p:txBody>
-      </p:sp>
-      <p:sp>
-        <p:nvSpPr>
-          <p:cNvPr id="6" name="Slide Number Placeholder 5"/>
-          <p:cNvSpPr>
-            <a:spLocks noGrp="1"/>
-          </p:cNvSpPr>
-          <p:nvPr>
-            <p:ph type="sldNum" sz="quarter" idx="12"/>
-          </p:nvPr>
-        </p:nvSpPr>
-        <p:spPr/>
-        <p:txBody>
-          <a:bodyPr/>
-          <a:lstStyle/>
-          <a:p>
-            <a:fld id="{D6FC3842-8F1D-4555-8C75-B3B22928202B}" type="slidenum">
-              <a:rPr lang="en-US" smtClean="0"/>
-              <a:t>‹#›</a:t>
-            </a:fld>
-            <a:endParaRPr lang="en-US"/>
-          </a:p>
-        </p:txBody>
-      </p:sp>
+      <p:cxnSp>
+        <p:nvCxnSpPr>
+          <p:cNvPr id="15" name="Straight Connector 14"/>
+          <p:cNvCxnSpPr/>
+          <p:nvPr/>
+        </p:nvCxnSpPr>
+        <p:spPr>
+          <a:xfrm>
+            <a:off x="303255" y="1488727"/>
+            <a:ext cx="5561213" cy="0"/>
+          </a:xfrm>
+          <a:prstGeom prst="line">
+            <a:avLst/>
+          </a:prstGeom>
+          <a:ln w="31750"/>
+        </p:spPr>
+        <p:style>
+          <a:lnRef idx="3">
+            <a:schemeClr val="accent1"/>
+          </a:lnRef>
+          <a:fillRef idx="0">
+            <a:schemeClr val="accent1"/>
+          </a:fillRef>
+          <a:effectRef idx="2">
+            <a:schemeClr val="accent1"/>
+          </a:effectRef>
+          <a:fontRef idx="minor">
+            <a:schemeClr val="tx1"/>
+          </a:fontRef>
+        </p:style>
+      </p:cxnSp>
     </p:spTree>
     <p:extLst>
       <p:ext uri="{BB962C8B-B14F-4D97-AF65-F5344CB8AC3E}">
-        <p14:creationId xmlns:p14="http://schemas.microsoft.com/office/powerpoint/2010/main" val="2757251286"/>
+        <p14:creationId xmlns:p14="http://schemas.microsoft.com/office/powerpoint/2010/main" val="1205197013"/>
       </p:ext>
     </p:extLst>
   </p:cSld>
@@ -671,7 +931,7 @@
     <p:bg>
       <p:bgPr>
         <a:blipFill dpi="0" rotWithShape="1">
-          <a:blip r:embed="rId5">
+          <a:blip r:embed="rId6">
             <a:lum/>
           </a:blip>
           <a:srcRect/>
@@ -756,38 +1016,37 @@
           <a:p>
             <a:pPr lvl="0"/>
             <a:r>
-              <a:rPr lang="en-US"/>
+              <a:rPr lang="en-US" dirty="0"/>
               <a:t>Edit Master text styles</a:t>
             </a:r>
           </a:p>
           <a:p>
             <a:pPr lvl="1"/>
             <a:r>
-              <a:rPr lang="en-US"/>
+              <a:rPr lang="en-US" dirty="0"/>
               <a:t>Second level</a:t>
             </a:r>
           </a:p>
           <a:p>
             <a:pPr lvl="2"/>
             <a:r>
-              <a:rPr lang="en-US"/>
+              <a:rPr lang="en-US" dirty="0"/>
               <a:t>Third level</a:t>
             </a:r>
           </a:p>
           <a:p>
             <a:pPr lvl="3"/>
             <a:r>
-              <a:rPr lang="en-US"/>
+              <a:rPr lang="en-US" dirty="0"/>
               <a:t>Fourth level</a:t>
             </a:r>
           </a:p>
           <a:p>
             <a:pPr lvl="4"/>
             <a:r>
-              <a:rPr lang="en-US"/>
+              <a:rPr lang="en-US" dirty="0"/>
               <a:t>Fifth level</a:t>
             </a:r>
-            <a:endParaRPr lang="en-US" dirty="0"/>
           </a:p>
         </p:txBody>
       </p:sp>
@@ -826,7 +1085,7 @@
           <a:p>
             <a:fld id="{1DD3C610-0DB2-47DC-8EBA-6CA1535FDECD}" type="datetimeFigureOut">
               <a:rPr lang="en-US" smtClean="0"/>
-              <a:t>5/13/2016</a:t>
+              <a:t>6/1/2016</a:t>
             </a:fld>
             <a:endParaRPr lang="en-US"/>
           </a:p>
@@ -921,7 +1180,8 @@
   <p:sldLayoutIdLst>
     <p:sldLayoutId id="2147483666" r:id="rId1"/>
     <p:sldLayoutId id="2147483667" r:id="rId2"/>
-    <p:sldLayoutId id="2147483665" r:id="rId3"/>
+    <p:sldLayoutId id="2147483668" r:id="rId3"/>
+    <p:sldLayoutId id="2147483669" r:id="rId4"/>
   </p:sldLayoutIdLst>
   <p:txStyles>
     <p:titleStyle>

</xml_diff>